<commit_message>
files for sage maker
</commit_message>
<xml_diff>
--- a/LLM_Dashboard.pptx
+++ b/LLM_Dashboard.pptx
@@ -10203,7 +10203,7 @@
                 <a:cs typeface="Arial"/>
                 <a:sym typeface="Arial"/>
               </a:rPr>
-              <a:t>LLM Langchain Intro ( common questions to chatgoogle Gen AI)</a:t>
+              <a:t>LLM Langchain interactive( common questions to chatgoogle Gen AI)</a:t>
             </a:r>
             <a:endParaRPr sz="1150">
               <a:solidFill>
@@ -10262,8 +10262,8 @@
         </p:blipFill>
         <p:spPr>
           <a:xfrm>
-            <a:off x="1143000" y="1147775"/>
-            <a:ext cx="6261475" cy="3327525"/>
+            <a:off x="699275" y="1067775"/>
+            <a:ext cx="7350075" cy="3690600"/>
           </a:xfrm>
           <a:prstGeom prst="rect">
             <a:avLst/>

</xml_diff>